<commit_message>
change perspective in pptx
</commit_message>
<xml_diff>
--- a/presentation/render/career_init.pptx
+++ b/presentation/render/career_init.pptx
@@ -8,7 +8,7 @@
     <p:sldId id="256" r:id="rId2"/>
     <p:sldId id="257" r:id="rId3"/>
   </p:sldIdLst>
-  <p:sldSz cx="9144000" cy="6858000" type="screen4x3"/>
+  <p:sldSz cx="12192000" cy="6858000"/>
   <p:notesSz cx="6858000" cy="9144000"/>
   <p:defaultTextStyle>
     <a:defPPr>
@@ -108,12 +108,12 @@
   <p:extLst>
     <p:ext uri="{EFAFB233-063F-42B5-8137-9DF3F51BA10A}">
       <p15:sldGuideLst xmlns:p15="http://schemas.microsoft.com/office/powerpoint/2012/main">
-        <p15:guide id="1" orient="horz" pos="2160">
+        <p15:guide id="1" orient="horz" pos="2160" userDrawn="1">
           <p15:clr>
             <a:srgbClr val="A4A3A4"/>
           </p15:clr>
         </p15:guide>
-        <p15:guide id="2" pos="2880">
+        <p15:guide id="2" pos="3840" userDrawn="1">
           <p15:clr>
             <a:srgbClr val="A4A3A4"/>
           </p15:clr>
@@ -153,8 +153,8 @@
         </p:nvSpPr>
         <p:spPr>
           <a:xfrm>
-            <a:off x="685800" y="2130425"/>
-            <a:ext cx="7772400" cy="1470025"/>
+            <a:off x="914400" y="2130426"/>
+            <a:ext cx="10363200" cy="1470025"/>
           </a:xfrm>
         </p:spPr>
         <p:txBody>
@@ -162,10 +162,9 @@
           <a:lstStyle/>
           <a:p>
             <a:r>
-              <a:rPr lang="en-US" smtClean="0"/>
+              <a:rPr lang="en-US"/>
               <a:t>Click to edit Master title style</a:t>
             </a:r>
-            <a:endParaRPr lang="en-US"/>
           </a:p>
         </p:txBody>
       </p:sp>
@@ -181,8 +180,8 @@
         </p:nvSpPr>
         <p:spPr>
           <a:xfrm>
-            <a:off x="1371600" y="3886200"/>
-            <a:ext cx="6400800" cy="1752600"/>
+            <a:off x="1828800" y="3886200"/>
+            <a:ext cx="8534400" cy="1752600"/>
           </a:xfrm>
         </p:spPr>
         <p:txBody>
@@ -281,10 +280,9 @@
           </a:lstStyle>
           <a:p>
             <a:r>
-              <a:rPr lang="en-US" smtClean="0"/>
+              <a:rPr lang="en-US"/>
               <a:t>Click to edit Master subtitle style</a:t>
             </a:r>
-            <a:endParaRPr lang="en-US"/>
           </a:p>
         </p:txBody>
       </p:sp>
@@ -305,7 +303,7 @@
           <a:p>
             <a:fld id="{241EB5C9-1307-BA42-ABA2-0BC069CD8E7F}" type="datetimeFigureOut">
               <a:rPr lang="en-US" smtClean="0"/>
-              <a:t>4/5/2019</a:t>
+              <a:t>2021-11-07</a:t>
             </a:fld>
             <a:endParaRPr lang="en-US"/>
           </a:p>
@@ -399,10 +397,9 @@
           <a:lstStyle/>
           <a:p>
             <a:r>
-              <a:rPr lang="en-US" smtClean="0"/>
+              <a:rPr lang="en-US"/>
               <a:t>Click to edit Master title style</a:t>
             </a:r>
-            <a:endParaRPr lang="en-US"/>
           </a:p>
         </p:txBody>
       </p:sp>
@@ -423,38 +420,37 @@
           <a:p>
             <a:pPr lvl="0"/>
             <a:r>
-              <a:rPr lang="en-US" smtClean="0"/>
+              <a:rPr lang="en-US"/>
               <a:t>Click to edit Master text styles</a:t>
             </a:r>
           </a:p>
           <a:p>
             <a:pPr lvl="1"/>
             <a:r>
-              <a:rPr lang="en-US" smtClean="0"/>
+              <a:rPr lang="en-US"/>
               <a:t>Second level</a:t>
             </a:r>
           </a:p>
           <a:p>
             <a:pPr lvl="2"/>
             <a:r>
-              <a:rPr lang="en-US" smtClean="0"/>
+              <a:rPr lang="en-US"/>
               <a:t>Third level</a:t>
             </a:r>
           </a:p>
           <a:p>
             <a:pPr lvl="3"/>
             <a:r>
-              <a:rPr lang="en-US" smtClean="0"/>
+              <a:rPr lang="en-US"/>
               <a:t>Fourth level</a:t>
             </a:r>
           </a:p>
           <a:p>
             <a:pPr lvl="4"/>
             <a:r>
-              <a:rPr lang="en-US" smtClean="0"/>
+              <a:rPr lang="en-US"/>
               <a:t>Fifth level</a:t>
             </a:r>
-            <a:endParaRPr lang="en-US"/>
           </a:p>
         </p:txBody>
       </p:sp>
@@ -475,7 +471,7 @@
           <a:p>
             <a:fld id="{241EB5C9-1307-BA42-ABA2-0BC069CD8E7F}" type="datetimeFigureOut">
               <a:rPr lang="en-US" smtClean="0"/>
-              <a:t>4/5/2019</a:t>
+              <a:t>2021-11-07</a:t>
             </a:fld>
             <a:endParaRPr lang="en-US"/>
           </a:p>
@@ -565,8 +561,8 @@
         </p:nvSpPr>
         <p:spPr>
           <a:xfrm>
-            <a:off x="6629400" y="274638"/>
-            <a:ext cx="2057400" cy="5851525"/>
+            <a:off x="8839200" y="274639"/>
+            <a:ext cx="2743200" cy="5851525"/>
           </a:xfrm>
         </p:spPr>
         <p:txBody>
@@ -574,10 +570,9 @@
           <a:lstStyle/>
           <a:p>
             <a:r>
-              <a:rPr lang="en-US" smtClean="0"/>
+              <a:rPr lang="en-US"/>
               <a:t>Click to edit Master title style</a:t>
             </a:r>
-            <a:endParaRPr lang="en-US"/>
           </a:p>
         </p:txBody>
       </p:sp>
@@ -593,8 +588,8 @@
         </p:nvSpPr>
         <p:spPr>
           <a:xfrm>
-            <a:off x="457200" y="274638"/>
-            <a:ext cx="6019800" cy="5851525"/>
+            <a:off x="609600" y="274639"/>
+            <a:ext cx="8026400" cy="5851525"/>
           </a:xfrm>
         </p:spPr>
         <p:txBody>
@@ -603,38 +598,37 @@
           <a:p>
             <a:pPr lvl="0"/>
             <a:r>
-              <a:rPr lang="en-US" smtClean="0"/>
+              <a:rPr lang="en-US"/>
               <a:t>Click to edit Master text styles</a:t>
             </a:r>
           </a:p>
           <a:p>
             <a:pPr lvl="1"/>
             <a:r>
-              <a:rPr lang="en-US" smtClean="0"/>
+              <a:rPr lang="en-US"/>
               <a:t>Second level</a:t>
             </a:r>
           </a:p>
           <a:p>
             <a:pPr lvl="2"/>
             <a:r>
-              <a:rPr lang="en-US" smtClean="0"/>
+              <a:rPr lang="en-US"/>
               <a:t>Third level</a:t>
             </a:r>
           </a:p>
           <a:p>
             <a:pPr lvl="3"/>
             <a:r>
-              <a:rPr lang="en-US" smtClean="0"/>
+              <a:rPr lang="en-US"/>
               <a:t>Fourth level</a:t>
             </a:r>
           </a:p>
           <a:p>
             <a:pPr lvl="4"/>
             <a:r>
-              <a:rPr lang="en-US" smtClean="0"/>
+              <a:rPr lang="en-US"/>
               <a:t>Fifth level</a:t>
             </a:r>
-            <a:endParaRPr lang="en-US"/>
           </a:p>
         </p:txBody>
       </p:sp>
@@ -655,7 +649,7 @@
           <a:p>
             <a:fld id="{241EB5C9-1307-BA42-ABA2-0BC069CD8E7F}" type="datetimeFigureOut">
               <a:rPr lang="en-US" smtClean="0"/>
-              <a:t>4/5/2019</a:t>
+              <a:t>2021-11-07</a:t>
             </a:fld>
             <a:endParaRPr lang="en-US"/>
           </a:p>
@@ -749,10 +743,9 @@
           <a:lstStyle/>
           <a:p>
             <a:r>
-              <a:rPr lang="en-US" smtClean="0"/>
+              <a:rPr lang="en-US"/>
               <a:t>Click to edit Master title style</a:t>
             </a:r>
-            <a:endParaRPr lang="en-US"/>
           </a:p>
         </p:txBody>
       </p:sp>
@@ -773,38 +766,37 @@
           <a:p>
             <a:pPr lvl="0"/>
             <a:r>
-              <a:rPr lang="en-US" smtClean="0"/>
+              <a:rPr lang="en-US"/>
               <a:t>Click to edit Master text styles</a:t>
             </a:r>
           </a:p>
           <a:p>
             <a:pPr lvl="1"/>
             <a:r>
-              <a:rPr lang="en-US" smtClean="0"/>
+              <a:rPr lang="en-US"/>
               <a:t>Second level</a:t>
             </a:r>
           </a:p>
           <a:p>
             <a:pPr lvl="2"/>
             <a:r>
-              <a:rPr lang="en-US" smtClean="0"/>
+              <a:rPr lang="en-US"/>
               <a:t>Third level</a:t>
             </a:r>
           </a:p>
           <a:p>
             <a:pPr lvl="3"/>
             <a:r>
-              <a:rPr lang="en-US" smtClean="0"/>
+              <a:rPr lang="en-US"/>
               <a:t>Fourth level</a:t>
             </a:r>
           </a:p>
           <a:p>
             <a:pPr lvl="4"/>
             <a:r>
-              <a:rPr lang="en-US" smtClean="0"/>
+              <a:rPr lang="en-US"/>
               <a:t>Fifth level</a:t>
             </a:r>
-            <a:endParaRPr lang="en-US"/>
           </a:p>
         </p:txBody>
       </p:sp>
@@ -825,7 +817,7 @@
           <a:p>
             <a:fld id="{241EB5C9-1307-BA42-ABA2-0BC069CD8E7F}" type="datetimeFigureOut">
               <a:rPr lang="en-US" smtClean="0"/>
-              <a:t>4/5/2019</a:t>
+              <a:t>2021-11-07</a:t>
             </a:fld>
             <a:endParaRPr lang="en-US"/>
           </a:p>
@@ -915,8 +907,8 @@
         </p:nvSpPr>
         <p:spPr>
           <a:xfrm>
-            <a:off x="722313" y="4406900"/>
-            <a:ext cx="7772400" cy="1362075"/>
+            <a:off x="963084" y="4406901"/>
+            <a:ext cx="10363200" cy="1362075"/>
           </a:xfrm>
         </p:spPr>
         <p:txBody>
@@ -928,10 +920,9 @@
           </a:lstStyle>
           <a:p>
             <a:r>
-              <a:rPr lang="en-US" smtClean="0"/>
+              <a:rPr lang="en-US"/>
               <a:t>Click to edit Master title style</a:t>
             </a:r>
-            <a:endParaRPr lang="en-US"/>
           </a:p>
         </p:txBody>
       </p:sp>
@@ -947,8 +938,8 @@
         </p:nvSpPr>
         <p:spPr>
           <a:xfrm>
-            <a:off x="722313" y="2906713"/>
-            <a:ext cx="7772400" cy="1500187"/>
+            <a:off x="963084" y="2906713"/>
+            <a:ext cx="10363200" cy="1500187"/>
           </a:xfrm>
         </p:spPr>
         <p:txBody>
@@ -1048,7 +1039,7 @@
           <a:p>
             <a:pPr lvl="0"/>
             <a:r>
-              <a:rPr lang="en-US" smtClean="0"/>
+              <a:rPr lang="en-US"/>
               <a:t>Click to edit Master text styles</a:t>
             </a:r>
           </a:p>
@@ -1071,7 +1062,7 @@
           <a:p>
             <a:fld id="{241EB5C9-1307-BA42-ABA2-0BC069CD8E7F}" type="datetimeFigureOut">
               <a:rPr lang="en-US" smtClean="0"/>
-              <a:t>4/5/2019</a:t>
+              <a:t>2021-11-07</a:t>
             </a:fld>
             <a:endParaRPr lang="en-US"/>
           </a:p>
@@ -1165,10 +1156,9 @@
           <a:lstStyle/>
           <a:p>
             <a:r>
-              <a:rPr lang="en-US" smtClean="0"/>
+              <a:rPr lang="en-US"/>
               <a:t>Click to edit Master title style</a:t>
             </a:r>
-            <a:endParaRPr lang="en-US"/>
           </a:p>
         </p:txBody>
       </p:sp>
@@ -1184,8 +1174,8 @@
         </p:nvSpPr>
         <p:spPr>
           <a:xfrm>
-            <a:off x="457200" y="1600200"/>
-            <a:ext cx="4038600" cy="4525963"/>
+            <a:off x="609600" y="1600201"/>
+            <a:ext cx="5384800" cy="4525963"/>
           </a:xfrm>
         </p:spPr>
         <p:txBody>
@@ -1222,38 +1212,37 @@
           <a:p>
             <a:pPr lvl="0"/>
             <a:r>
-              <a:rPr lang="en-US" smtClean="0"/>
+              <a:rPr lang="en-US"/>
               <a:t>Click to edit Master text styles</a:t>
             </a:r>
           </a:p>
           <a:p>
             <a:pPr lvl="1"/>
             <a:r>
-              <a:rPr lang="en-US" smtClean="0"/>
+              <a:rPr lang="en-US"/>
               <a:t>Second level</a:t>
             </a:r>
           </a:p>
           <a:p>
             <a:pPr lvl="2"/>
             <a:r>
-              <a:rPr lang="en-US" smtClean="0"/>
+              <a:rPr lang="en-US"/>
               <a:t>Third level</a:t>
             </a:r>
           </a:p>
           <a:p>
             <a:pPr lvl="3"/>
             <a:r>
-              <a:rPr lang="en-US" smtClean="0"/>
+              <a:rPr lang="en-US"/>
               <a:t>Fourth level</a:t>
             </a:r>
           </a:p>
           <a:p>
             <a:pPr lvl="4"/>
             <a:r>
-              <a:rPr lang="en-US" smtClean="0"/>
+              <a:rPr lang="en-US"/>
               <a:t>Fifth level</a:t>
             </a:r>
-            <a:endParaRPr lang="en-US"/>
           </a:p>
         </p:txBody>
       </p:sp>
@@ -1269,8 +1258,8 @@
         </p:nvSpPr>
         <p:spPr>
           <a:xfrm>
-            <a:off x="4648200" y="1600200"/>
-            <a:ext cx="4038600" cy="4525963"/>
+            <a:off x="6197600" y="1600201"/>
+            <a:ext cx="5384800" cy="4525963"/>
           </a:xfrm>
         </p:spPr>
         <p:txBody>
@@ -1307,38 +1296,37 @@
           <a:p>
             <a:pPr lvl="0"/>
             <a:r>
-              <a:rPr lang="en-US" smtClean="0"/>
+              <a:rPr lang="en-US"/>
               <a:t>Click to edit Master text styles</a:t>
             </a:r>
           </a:p>
           <a:p>
             <a:pPr lvl="1"/>
             <a:r>
-              <a:rPr lang="en-US" smtClean="0"/>
+              <a:rPr lang="en-US"/>
               <a:t>Second level</a:t>
             </a:r>
           </a:p>
           <a:p>
             <a:pPr lvl="2"/>
             <a:r>
-              <a:rPr lang="en-US" smtClean="0"/>
+              <a:rPr lang="en-US"/>
               <a:t>Third level</a:t>
             </a:r>
           </a:p>
           <a:p>
             <a:pPr lvl="3"/>
             <a:r>
-              <a:rPr lang="en-US" smtClean="0"/>
+              <a:rPr lang="en-US"/>
               <a:t>Fourth level</a:t>
             </a:r>
           </a:p>
           <a:p>
             <a:pPr lvl="4"/>
             <a:r>
-              <a:rPr lang="en-US" smtClean="0"/>
+              <a:rPr lang="en-US"/>
               <a:t>Fifth level</a:t>
             </a:r>
-            <a:endParaRPr lang="en-US"/>
           </a:p>
         </p:txBody>
       </p:sp>
@@ -1359,7 +1347,7 @@
           <a:p>
             <a:fld id="{241EB5C9-1307-BA42-ABA2-0BC069CD8E7F}" type="datetimeFigureOut">
               <a:rPr lang="en-US" smtClean="0"/>
-              <a:t>4/5/2019</a:t>
+              <a:t>2021-11-07</a:t>
             </a:fld>
             <a:endParaRPr lang="en-US"/>
           </a:p>
@@ -1457,10 +1445,9 @@
           </a:lstStyle>
           <a:p>
             <a:r>
-              <a:rPr lang="en-US" smtClean="0"/>
+              <a:rPr lang="en-US"/>
               <a:t>Click to edit Master title style</a:t>
             </a:r>
-            <a:endParaRPr lang="en-US"/>
           </a:p>
         </p:txBody>
       </p:sp>
@@ -1476,8 +1463,8 @@
         </p:nvSpPr>
         <p:spPr>
           <a:xfrm>
-            <a:off x="457200" y="1535113"/>
-            <a:ext cx="4040188" cy="639762"/>
+            <a:off x="609600" y="1535113"/>
+            <a:ext cx="5386917" cy="639762"/>
           </a:xfrm>
         </p:spPr>
         <p:txBody>
@@ -1523,7 +1510,7 @@
           <a:p>
             <a:pPr lvl="0"/>
             <a:r>
-              <a:rPr lang="en-US" smtClean="0"/>
+              <a:rPr lang="en-US"/>
               <a:t>Click to edit Master text styles</a:t>
             </a:r>
           </a:p>
@@ -1541,8 +1528,8 @@
         </p:nvSpPr>
         <p:spPr>
           <a:xfrm>
-            <a:off x="457200" y="2174875"/>
-            <a:ext cx="4040188" cy="3951288"/>
+            <a:off x="609600" y="2174875"/>
+            <a:ext cx="5386917" cy="3951288"/>
           </a:xfrm>
         </p:spPr>
         <p:txBody>
@@ -1579,38 +1566,37 @@
           <a:p>
             <a:pPr lvl="0"/>
             <a:r>
-              <a:rPr lang="en-US" smtClean="0"/>
+              <a:rPr lang="en-US"/>
               <a:t>Click to edit Master text styles</a:t>
             </a:r>
           </a:p>
           <a:p>
             <a:pPr lvl="1"/>
             <a:r>
-              <a:rPr lang="en-US" smtClean="0"/>
+              <a:rPr lang="en-US"/>
               <a:t>Second level</a:t>
             </a:r>
           </a:p>
           <a:p>
             <a:pPr lvl="2"/>
             <a:r>
-              <a:rPr lang="en-US" smtClean="0"/>
+              <a:rPr lang="en-US"/>
               <a:t>Third level</a:t>
             </a:r>
           </a:p>
           <a:p>
             <a:pPr lvl="3"/>
             <a:r>
-              <a:rPr lang="en-US" smtClean="0"/>
+              <a:rPr lang="en-US"/>
               <a:t>Fourth level</a:t>
             </a:r>
           </a:p>
           <a:p>
             <a:pPr lvl="4"/>
             <a:r>
-              <a:rPr lang="en-US" smtClean="0"/>
+              <a:rPr lang="en-US"/>
               <a:t>Fifth level</a:t>
             </a:r>
-            <a:endParaRPr lang="en-US"/>
           </a:p>
         </p:txBody>
       </p:sp>
@@ -1626,8 +1612,8 @@
         </p:nvSpPr>
         <p:spPr>
           <a:xfrm>
-            <a:off x="4645025" y="1535113"/>
-            <a:ext cx="4041775" cy="639762"/>
+            <a:off x="6193368" y="1535113"/>
+            <a:ext cx="5389033" cy="639762"/>
           </a:xfrm>
         </p:spPr>
         <p:txBody>
@@ -1673,7 +1659,7 @@
           <a:p>
             <a:pPr lvl="0"/>
             <a:r>
-              <a:rPr lang="en-US" smtClean="0"/>
+              <a:rPr lang="en-US"/>
               <a:t>Click to edit Master text styles</a:t>
             </a:r>
           </a:p>
@@ -1691,8 +1677,8 @@
         </p:nvSpPr>
         <p:spPr>
           <a:xfrm>
-            <a:off x="4645025" y="2174875"/>
-            <a:ext cx="4041775" cy="3951288"/>
+            <a:off x="6193368" y="2174875"/>
+            <a:ext cx="5389033" cy="3951288"/>
           </a:xfrm>
         </p:spPr>
         <p:txBody>
@@ -1729,38 +1715,37 @@
           <a:p>
             <a:pPr lvl="0"/>
             <a:r>
-              <a:rPr lang="en-US" smtClean="0"/>
+              <a:rPr lang="en-US"/>
               <a:t>Click to edit Master text styles</a:t>
             </a:r>
           </a:p>
           <a:p>
             <a:pPr lvl="1"/>
             <a:r>
-              <a:rPr lang="en-US" smtClean="0"/>
+              <a:rPr lang="en-US"/>
               <a:t>Second level</a:t>
             </a:r>
           </a:p>
           <a:p>
             <a:pPr lvl="2"/>
             <a:r>
-              <a:rPr lang="en-US" smtClean="0"/>
+              <a:rPr lang="en-US"/>
               <a:t>Third level</a:t>
             </a:r>
           </a:p>
           <a:p>
             <a:pPr lvl="3"/>
             <a:r>
-              <a:rPr lang="en-US" smtClean="0"/>
+              <a:rPr lang="en-US"/>
               <a:t>Fourth level</a:t>
             </a:r>
           </a:p>
           <a:p>
             <a:pPr lvl="4"/>
             <a:r>
-              <a:rPr lang="en-US" smtClean="0"/>
+              <a:rPr lang="en-US"/>
               <a:t>Fifth level</a:t>
             </a:r>
-            <a:endParaRPr lang="en-US"/>
           </a:p>
         </p:txBody>
       </p:sp>
@@ -1781,7 +1766,7 @@
           <a:p>
             <a:fld id="{241EB5C9-1307-BA42-ABA2-0BC069CD8E7F}" type="datetimeFigureOut">
               <a:rPr lang="en-US" smtClean="0"/>
-              <a:t>4/5/2019</a:t>
+              <a:t>2021-11-07</a:t>
             </a:fld>
             <a:endParaRPr lang="en-US"/>
           </a:p>
@@ -1875,10 +1860,9 @@
           <a:lstStyle/>
           <a:p>
             <a:r>
-              <a:rPr lang="en-US" smtClean="0"/>
+              <a:rPr lang="en-US"/>
               <a:t>Click to edit Master title style</a:t>
             </a:r>
-            <a:endParaRPr lang="en-US"/>
           </a:p>
         </p:txBody>
       </p:sp>
@@ -1899,7 +1883,7 @@
           <a:p>
             <a:fld id="{241EB5C9-1307-BA42-ABA2-0BC069CD8E7F}" type="datetimeFigureOut">
               <a:rPr lang="en-US" smtClean="0"/>
-              <a:t>4/5/2019</a:t>
+              <a:t>2021-11-07</a:t>
             </a:fld>
             <a:endParaRPr lang="en-US"/>
           </a:p>
@@ -1994,7 +1978,7 @@
           <a:p>
             <a:fld id="{241EB5C9-1307-BA42-ABA2-0BC069CD8E7F}" type="datetimeFigureOut">
               <a:rPr lang="en-US" smtClean="0"/>
-              <a:t>4/5/2019</a:t>
+              <a:t>2021-11-07</a:t>
             </a:fld>
             <a:endParaRPr lang="en-US"/>
           </a:p>
@@ -2084,8 +2068,8 @@
         </p:nvSpPr>
         <p:spPr>
           <a:xfrm>
-            <a:off x="457200" y="273050"/>
-            <a:ext cx="3008313" cy="1162050"/>
+            <a:off x="609601" y="273050"/>
+            <a:ext cx="4011084" cy="1162050"/>
           </a:xfrm>
         </p:spPr>
         <p:txBody>
@@ -2097,10 +2081,9 @@
           </a:lstStyle>
           <a:p>
             <a:r>
-              <a:rPr lang="en-US" smtClean="0"/>
+              <a:rPr lang="en-US"/>
               <a:t>Click to edit Master title style</a:t>
             </a:r>
-            <a:endParaRPr lang="en-US"/>
           </a:p>
         </p:txBody>
       </p:sp>
@@ -2116,8 +2099,8 @@
         </p:nvSpPr>
         <p:spPr>
           <a:xfrm>
-            <a:off x="3575050" y="273050"/>
-            <a:ext cx="5111750" cy="5853113"/>
+            <a:off x="4766733" y="273051"/>
+            <a:ext cx="6815667" cy="5853113"/>
           </a:xfrm>
         </p:spPr>
         <p:txBody>
@@ -2154,38 +2137,37 @@
           <a:p>
             <a:pPr lvl="0"/>
             <a:r>
-              <a:rPr lang="en-US" smtClean="0"/>
+              <a:rPr lang="en-US"/>
               <a:t>Click to edit Master text styles</a:t>
             </a:r>
           </a:p>
           <a:p>
             <a:pPr lvl="1"/>
             <a:r>
-              <a:rPr lang="en-US" smtClean="0"/>
+              <a:rPr lang="en-US"/>
               <a:t>Second level</a:t>
             </a:r>
           </a:p>
           <a:p>
             <a:pPr lvl="2"/>
             <a:r>
-              <a:rPr lang="en-US" smtClean="0"/>
+              <a:rPr lang="en-US"/>
               <a:t>Third level</a:t>
             </a:r>
           </a:p>
           <a:p>
             <a:pPr lvl="3"/>
             <a:r>
-              <a:rPr lang="en-US" smtClean="0"/>
+              <a:rPr lang="en-US"/>
               <a:t>Fourth level</a:t>
             </a:r>
           </a:p>
           <a:p>
             <a:pPr lvl="4"/>
             <a:r>
-              <a:rPr lang="en-US" smtClean="0"/>
+              <a:rPr lang="en-US"/>
               <a:t>Fifth level</a:t>
             </a:r>
-            <a:endParaRPr lang="en-US"/>
           </a:p>
         </p:txBody>
       </p:sp>
@@ -2201,8 +2183,8 @@
         </p:nvSpPr>
         <p:spPr>
           <a:xfrm>
-            <a:off x="457200" y="1435100"/>
-            <a:ext cx="3008313" cy="4691063"/>
+            <a:off x="609601" y="1435101"/>
+            <a:ext cx="4011084" cy="4691063"/>
           </a:xfrm>
         </p:spPr>
         <p:txBody>
@@ -2248,7 +2230,7 @@
           <a:p>
             <a:pPr lvl="0"/>
             <a:r>
-              <a:rPr lang="en-US" smtClean="0"/>
+              <a:rPr lang="en-US"/>
               <a:t>Click to edit Master text styles</a:t>
             </a:r>
           </a:p>
@@ -2271,7 +2253,7 @@
           <a:p>
             <a:fld id="{241EB5C9-1307-BA42-ABA2-0BC069CD8E7F}" type="datetimeFigureOut">
               <a:rPr lang="en-US" smtClean="0"/>
-              <a:t>4/5/2019</a:t>
+              <a:t>2021-11-07</a:t>
             </a:fld>
             <a:endParaRPr lang="en-US"/>
           </a:p>
@@ -2361,8 +2343,8 @@
         </p:nvSpPr>
         <p:spPr>
           <a:xfrm>
-            <a:off x="1792288" y="4800600"/>
-            <a:ext cx="5486400" cy="566738"/>
+            <a:off x="2389717" y="4800600"/>
+            <a:ext cx="7315200" cy="566738"/>
           </a:xfrm>
         </p:spPr>
         <p:txBody>
@@ -2374,10 +2356,9 @@
           </a:lstStyle>
           <a:p>
             <a:r>
-              <a:rPr lang="en-US" smtClean="0"/>
+              <a:rPr lang="en-US"/>
               <a:t>Click to edit Master title style</a:t>
             </a:r>
-            <a:endParaRPr lang="en-US"/>
           </a:p>
         </p:txBody>
       </p:sp>
@@ -2393,8 +2374,8 @@
         </p:nvSpPr>
         <p:spPr>
           <a:xfrm>
-            <a:off x="1792288" y="612775"/>
-            <a:ext cx="5486400" cy="4114800"/>
+            <a:off x="2389717" y="612775"/>
+            <a:ext cx="7315200" cy="4114800"/>
           </a:xfrm>
         </p:spPr>
         <p:txBody>
@@ -2454,8 +2435,8 @@
         </p:nvSpPr>
         <p:spPr>
           <a:xfrm>
-            <a:off x="1792288" y="5367338"/>
-            <a:ext cx="5486400" cy="804862"/>
+            <a:off x="2389717" y="5367338"/>
+            <a:ext cx="7315200" cy="804862"/>
           </a:xfrm>
         </p:spPr>
         <p:txBody>
@@ -2501,7 +2482,7 @@
           <a:p>
             <a:pPr lvl="0"/>
             <a:r>
-              <a:rPr lang="en-US" smtClean="0"/>
+              <a:rPr lang="en-US"/>
               <a:t>Click to edit Master text styles</a:t>
             </a:r>
           </a:p>
@@ -2524,7 +2505,7 @@
           <a:p>
             <a:fld id="{241EB5C9-1307-BA42-ABA2-0BC069CD8E7F}" type="datetimeFigureOut">
               <a:rPr lang="en-US" smtClean="0"/>
-              <a:t>4/5/2019</a:t>
+              <a:t>2021-11-07</a:t>
             </a:fld>
             <a:endParaRPr lang="en-US"/>
           </a:p>
@@ -2619,8 +2600,8 @@
         </p:nvSpPr>
         <p:spPr>
           <a:xfrm>
-            <a:off x="457200" y="274638"/>
-            <a:ext cx="8229600" cy="1143000"/>
+            <a:off x="609600" y="274638"/>
+            <a:ext cx="10972800" cy="1143000"/>
           </a:xfrm>
           <a:prstGeom prst="rect">
             <a:avLst/>
@@ -2633,10 +2614,9 @@
           <a:lstStyle/>
           <a:p>
             <a:r>
-              <a:rPr lang="en-US" smtClean="0"/>
+              <a:rPr lang="en-US"/>
               <a:t>Click to edit Master title style</a:t>
             </a:r>
-            <a:endParaRPr lang="en-US"/>
           </a:p>
         </p:txBody>
       </p:sp>
@@ -2652,8 +2632,8 @@
         </p:nvSpPr>
         <p:spPr>
           <a:xfrm>
-            <a:off x="457200" y="1600200"/>
-            <a:ext cx="8229600" cy="4525963"/>
+            <a:off x="609600" y="1600201"/>
+            <a:ext cx="10972800" cy="4525963"/>
           </a:xfrm>
           <a:prstGeom prst="rect">
             <a:avLst/>
@@ -2667,38 +2647,37 @@
           <a:p>
             <a:pPr lvl="0"/>
             <a:r>
-              <a:rPr lang="en-US" smtClean="0"/>
+              <a:rPr lang="en-US"/>
               <a:t>Click to edit Master text styles</a:t>
             </a:r>
           </a:p>
           <a:p>
             <a:pPr lvl="1"/>
             <a:r>
-              <a:rPr lang="en-US" smtClean="0"/>
+              <a:rPr lang="en-US"/>
               <a:t>Second level</a:t>
             </a:r>
           </a:p>
           <a:p>
             <a:pPr lvl="2"/>
             <a:r>
-              <a:rPr lang="en-US" smtClean="0"/>
+              <a:rPr lang="en-US"/>
               <a:t>Third level</a:t>
             </a:r>
           </a:p>
           <a:p>
             <a:pPr lvl="3"/>
             <a:r>
-              <a:rPr lang="en-US" smtClean="0"/>
+              <a:rPr lang="en-US"/>
               <a:t>Fourth level</a:t>
             </a:r>
           </a:p>
           <a:p>
             <a:pPr lvl="4"/>
             <a:r>
-              <a:rPr lang="en-US" smtClean="0"/>
+              <a:rPr lang="en-US"/>
               <a:t>Fifth level</a:t>
             </a:r>
-            <a:endParaRPr lang="en-US"/>
           </a:p>
         </p:txBody>
       </p:sp>
@@ -2714,8 +2693,8 @@
         </p:nvSpPr>
         <p:spPr>
           <a:xfrm>
-            <a:off x="457200" y="6356350"/>
-            <a:ext cx="2133600" cy="365125"/>
+            <a:off x="609600" y="6356351"/>
+            <a:ext cx="2844800" cy="365125"/>
           </a:xfrm>
           <a:prstGeom prst="rect">
             <a:avLst/>
@@ -2737,7 +2716,7 @@
           <a:p>
             <a:fld id="{241EB5C9-1307-BA42-ABA2-0BC069CD8E7F}" type="datetimeFigureOut">
               <a:rPr lang="en-US" smtClean="0"/>
-              <a:t>4/5/2019</a:t>
+              <a:t>2021-11-07</a:t>
             </a:fld>
             <a:endParaRPr lang="en-US"/>
           </a:p>
@@ -2755,8 +2734,8 @@
         </p:nvSpPr>
         <p:spPr>
           <a:xfrm>
-            <a:off x="3124200" y="6356350"/>
-            <a:ext cx="2895600" cy="365125"/>
+            <a:off x="4165600" y="6356351"/>
+            <a:ext cx="3860800" cy="365125"/>
           </a:xfrm>
           <a:prstGeom prst="rect">
             <a:avLst/>
@@ -2792,8 +2771,8 @@
         </p:nvSpPr>
         <p:spPr>
           <a:xfrm>
-            <a:off x="6553200" y="6356350"/>
-            <a:ext cx="2133600" cy="365125"/>
+            <a:off x="8737600" y="6356351"/>
+            <a:ext cx="2844800" cy="365125"/>
           </a:xfrm>
           <a:prstGeom prst="rect">
             <a:avLst/>

</xml_diff>